<commit_message>
Recommitting files with 9/28 Updates
While editing the paper, I noticed that several changes needed to be made across multiple files. Changes included the color scheme in the violin plot, grammatical mistakes in the paper Rmd file, and increasing the size of the summary table in the Data Cleaning.R file.
</commit_message>
<xml_diff>
--- a/UCSAS Slides.pptx
+++ b/UCSAS Slides.pptx
@@ -121,7 +121,7 @@
 <file path=ppt/revisionInfo.xml><?xml version="1.0" encoding="utf-8"?>
 <p1510:revInfo xmlns:a="http://schemas.openxmlformats.org/drawingml/2006/main" xmlns:r="http://schemas.openxmlformats.org/officeDocument/2006/relationships" xmlns:p1510="http://schemas.microsoft.com/office/powerpoint/2015/10/main">
   <p1510:revLst>
-    <p1510:client id="{9B4F4275-B193-47DB-B686-BF4B82FF7145}" v="103" dt="2021-09-24T22:27:28.723"/>
+    <p1510:client id="{9B4F4275-B193-47DB-B686-BF4B82FF7145}" v="110" dt="2021-09-29T03:24:21.928"/>
   </p1510:revLst>
 </p1510:revInfo>
 </file>
@@ -131,12 +131,12 @@
   <pc:docChgLst>
     <pc:chgData name="billyfryer@att.net" userId="08901168bcd6e0db" providerId="LiveId" clId="{9B4F4275-B193-47DB-B686-BF4B82FF7145}"/>
     <pc:docChg chg="undo custSel modSld sldOrd">
-      <pc:chgData name="billyfryer@att.net" userId="08901168bcd6e0db" providerId="LiveId" clId="{9B4F4275-B193-47DB-B686-BF4B82FF7145}" dt="2021-09-25T04:13:35.872" v="3331" actId="20577"/>
+      <pc:chgData name="billyfryer@att.net" userId="08901168bcd6e0db" providerId="LiveId" clId="{9B4F4275-B193-47DB-B686-BF4B82FF7145}" dt="2021-09-29T03:24:38.924" v="3838" actId="20577"/>
       <pc:docMkLst>
         <pc:docMk/>
       </pc:docMkLst>
       <pc:sldChg chg="addSp delSp modSp mod">
-        <pc:chgData name="billyfryer@att.net" userId="08901168bcd6e0db" providerId="LiveId" clId="{9B4F4275-B193-47DB-B686-BF4B82FF7145}" dt="2021-09-25T02:24:31.607" v="3058" actId="20577"/>
+        <pc:chgData name="billyfryer@att.net" userId="08901168bcd6e0db" providerId="LiveId" clId="{9B4F4275-B193-47DB-B686-BF4B82FF7145}" dt="2021-09-29T03:14:56.839" v="3476" actId="1076"/>
         <pc:sldMkLst>
           <pc:docMk/>
           <pc:sldMk cId="3204398941" sldId="256"/>
@@ -158,7 +158,7 @@
           </ac:spMkLst>
         </pc:spChg>
         <pc:spChg chg="mod">
-          <ac:chgData name="billyfryer@att.net" userId="08901168bcd6e0db" providerId="LiveId" clId="{9B4F4275-B193-47DB-B686-BF4B82FF7145}" dt="2021-09-25T02:24:31.607" v="3058" actId="20577"/>
+          <ac:chgData name="billyfryer@att.net" userId="08901168bcd6e0db" providerId="LiveId" clId="{9B4F4275-B193-47DB-B686-BF4B82FF7145}" dt="2021-09-29T03:14:52.921" v="3475" actId="1076"/>
           <ac:spMkLst>
             <pc:docMk/>
             <pc:sldMk cId="3204398941" sldId="256"/>
@@ -189,12 +189,28 @@
             <ac:spMk id="85" creationId="{06B16E91-863C-2745-B63A-9D0E5CC89229}"/>
           </ac:spMkLst>
         </pc:spChg>
+        <pc:picChg chg="add mod">
+          <ac:chgData name="billyfryer@att.net" userId="08901168bcd6e0db" providerId="LiveId" clId="{9B4F4275-B193-47DB-B686-BF4B82FF7145}" dt="2021-09-29T03:14:42.012" v="3470" actId="14100"/>
+          <ac:picMkLst>
+            <pc:docMk/>
+            <pc:sldMk cId="3204398941" sldId="256"/>
+            <ac:picMk id="3" creationId="{46E744D1-ADF4-41D7-AD6E-554547C743A8}"/>
+          </ac:picMkLst>
+        </pc:picChg>
         <pc:picChg chg="add del mod">
           <ac:chgData name="billyfryer@att.net" userId="08901168bcd6e0db" providerId="LiveId" clId="{9B4F4275-B193-47DB-B686-BF4B82FF7145}" dt="2021-09-24T22:27:02.503" v="2617" actId="478"/>
           <ac:picMkLst>
             <pc:docMk/>
             <pc:sldMk cId="3204398941" sldId="256"/>
             <ac:picMk id="3" creationId="{82998205-EEC3-4D06-8B03-D302EC4C7354}"/>
+          </ac:picMkLst>
+        </pc:picChg>
+        <pc:picChg chg="add mod">
+          <ac:chgData name="billyfryer@att.net" userId="08901168bcd6e0db" providerId="LiveId" clId="{9B4F4275-B193-47DB-B686-BF4B82FF7145}" dt="2021-09-29T03:14:56.839" v="3476" actId="1076"/>
+          <ac:picMkLst>
+            <pc:docMk/>
+            <pc:sldMk cId="3204398941" sldId="256"/>
+            <ac:picMk id="5" creationId="{262DB908-5865-4861-8845-4CE4BEE8B0AA}"/>
           </ac:picMkLst>
         </pc:picChg>
         <pc:picChg chg="add del mod">
@@ -213,6 +229,14 @@
             <ac:picMk id="6" creationId="{7B86B3FA-D3EF-44B4-AD2A-5F7D4B8BD232}"/>
           </ac:picMkLst>
         </pc:picChg>
+        <pc:picChg chg="add mod">
+          <ac:chgData name="billyfryer@att.net" userId="08901168bcd6e0db" providerId="LiveId" clId="{9B4F4275-B193-47DB-B686-BF4B82FF7145}" dt="2021-09-29T03:14:46.053" v="3472" actId="1076"/>
+          <ac:picMkLst>
+            <pc:docMk/>
+            <pc:sldMk cId="3204398941" sldId="256"/>
+            <ac:picMk id="7" creationId="{407679C4-4284-485B-A352-F431293D3AD9}"/>
+          </ac:picMkLst>
+        </pc:picChg>
         <pc:picChg chg="add del mod">
           <ac:chgData name="billyfryer@att.net" userId="08901168bcd6e0db" providerId="LiveId" clId="{9B4F4275-B193-47DB-B686-BF4B82FF7145}" dt="2021-09-24T22:02:19.405" v="1670" actId="478"/>
           <ac:picMkLst>
@@ -237,8 +261,8 @@
             <ac:picMk id="12" creationId="{489B95E1-A933-47DD-8056-A2CDC09CCE3F}"/>
           </ac:picMkLst>
         </pc:picChg>
-        <pc:picChg chg="add mod">
-          <ac:chgData name="billyfryer@att.net" userId="08901168bcd6e0db" providerId="LiveId" clId="{9B4F4275-B193-47DB-B686-BF4B82FF7145}" dt="2021-09-24T22:30:06.404" v="2672" actId="1035"/>
+        <pc:picChg chg="add del mod">
+          <ac:chgData name="billyfryer@att.net" userId="08901168bcd6e0db" providerId="LiveId" clId="{9B4F4275-B193-47DB-B686-BF4B82FF7145}" dt="2021-09-29T03:13:37.929" v="3358" actId="478"/>
           <ac:picMkLst>
             <pc:docMk/>
             <pc:sldMk cId="3204398941" sldId="256"/>
@@ -253,16 +277,16 @@
             <ac:picMk id="17" creationId="{3F9D3B06-2A20-4C7F-AEE5-0913E6A97C00}"/>
           </ac:picMkLst>
         </pc:picChg>
-        <pc:picChg chg="add mod">
-          <ac:chgData name="billyfryer@att.net" userId="08901168bcd6e0db" providerId="LiveId" clId="{9B4F4275-B193-47DB-B686-BF4B82FF7145}" dt="2021-09-24T22:30:06.404" v="2672" actId="1035"/>
+        <pc:picChg chg="add del mod">
+          <ac:chgData name="billyfryer@att.net" userId="08901168bcd6e0db" providerId="LiveId" clId="{9B4F4275-B193-47DB-B686-BF4B82FF7145}" dt="2021-09-29T03:13:08.728" v="3346" actId="478"/>
           <ac:picMkLst>
             <pc:docMk/>
             <pc:sldMk cId="3204398941" sldId="256"/>
             <ac:picMk id="19" creationId="{DCD18F6B-24F7-4A7C-A7DA-529C8CE02004}"/>
           </ac:picMkLst>
         </pc:picChg>
-        <pc:picChg chg="add mod">
-          <ac:chgData name="billyfryer@att.net" userId="08901168bcd6e0db" providerId="LiveId" clId="{9B4F4275-B193-47DB-B686-BF4B82FF7145}" dt="2021-09-24T22:30:06.404" v="2672" actId="1035"/>
+        <pc:picChg chg="add del mod">
+          <ac:chgData name="billyfryer@att.net" userId="08901168bcd6e0db" providerId="LiveId" clId="{9B4F4275-B193-47DB-B686-BF4B82FF7145}" dt="2021-09-29T03:14:31.435" v="3464" actId="478"/>
           <ac:picMkLst>
             <pc:docMk/>
             <pc:sldMk cId="3204398941" sldId="256"/>
@@ -271,7 +295,7 @@
         </pc:picChg>
       </pc:sldChg>
       <pc:sldChg chg="addSp delSp modSp mod">
-        <pc:chgData name="billyfryer@att.net" userId="08901168bcd6e0db" providerId="LiveId" clId="{9B4F4275-B193-47DB-B686-BF4B82FF7145}" dt="2021-09-25T04:13:35.872" v="3331" actId="20577"/>
+        <pc:chgData name="billyfryer@att.net" userId="08901168bcd6e0db" providerId="LiveId" clId="{9B4F4275-B193-47DB-B686-BF4B82FF7145}" dt="2021-09-29T03:24:38.924" v="3838" actId="20577"/>
         <pc:sldMkLst>
           <pc:docMk/>
           <pc:sldMk cId="1820573495" sldId="258"/>
@@ -293,7 +317,7 @@
           </ac:spMkLst>
         </pc:spChg>
         <pc:spChg chg="mod">
-          <ac:chgData name="billyfryer@att.net" userId="08901168bcd6e0db" providerId="LiveId" clId="{9B4F4275-B193-47DB-B686-BF4B82FF7145}" dt="2021-09-24T21:29:19.185" v="173" actId="20577"/>
+          <ac:chgData name="billyfryer@att.net" userId="08901168bcd6e0db" providerId="LiveId" clId="{9B4F4275-B193-47DB-B686-BF4B82FF7145}" dt="2021-09-29T03:24:22.419" v="3814" actId="20577"/>
           <ac:spMkLst>
             <pc:docMk/>
             <pc:sldMk cId="1820573495" sldId="258"/>
@@ -309,7 +333,7 @@
           </ac:spMkLst>
         </pc:spChg>
         <pc:spChg chg="mod">
-          <ac:chgData name="billyfryer@att.net" userId="08901168bcd6e0db" providerId="LiveId" clId="{9B4F4275-B193-47DB-B686-BF4B82FF7145}" dt="2021-09-25T04:13:35.872" v="3331" actId="20577"/>
+          <ac:chgData name="billyfryer@att.net" userId="08901168bcd6e0db" providerId="LiveId" clId="{9B4F4275-B193-47DB-B686-BF4B82FF7145}" dt="2021-09-29T03:23:48.745" v="3805" actId="20577"/>
           <ac:spMkLst>
             <pc:docMk/>
             <pc:sldMk cId="1820573495" sldId="258"/>
@@ -317,7 +341,7 @@
           </ac:spMkLst>
         </pc:spChg>
         <pc:spChg chg="mod">
-          <ac:chgData name="billyfryer@att.net" userId="08901168bcd6e0db" providerId="LiveId" clId="{9B4F4275-B193-47DB-B686-BF4B82FF7145}" dt="2021-09-24T21:48:29.423" v="901" actId="20577"/>
+          <ac:chgData name="billyfryer@att.net" userId="08901168bcd6e0db" providerId="LiveId" clId="{9B4F4275-B193-47DB-B686-BF4B82FF7145}" dt="2021-09-29T03:24:38.924" v="3838" actId="20577"/>
           <ac:spMkLst>
             <pc:docMk/>
             <pc:sldMk cId="1820573495" sldId="258"/>
@@ -461,7 +485,7 @@
         </pc:picChg>
       </pc:sldChg>
       <pc:sldChg chg="addSp delSp modSp mod ord">
-        <pc:chgData name="billyfryer@att.net" userId="08901168bcd6e0db" providerId="LiveId" clId="{9B4F4275-B193-47DB-B686-BF4B82FF7145}" dt="2021-09-24T22:26:13.771" v="2600" actId="1076"/>
+        <pc:chgData name="billyfryer@att.net" userId="08901168bcd6e0db" providerId="LiveId" clId="{9B4F4275-B193-47DB-B686-BF4B82FF7145}" dt="2021-09-29T03:19:41.620" v="3483" actId="14100"/>
         <pc:sldMkLst>
           <pc:docMk/>
           <pc:sldMk cId="3907321315" sldId="260"/>
@@ -538,6 +562,22 @@
             <ac:picMk id="3" creationId="{188E00E5-BD3F-45A7-894B-402E82137A75}"/>
           </ac:picMkLst>
         </pc:picChg>
+        <pc:picChg chg="add mod">
+          <ac:chgData name="billyfryer@att.net" userId="08901168bcd6e0db" providerId="LiveId" clId="{9B4F4275-B193-47DB-B686-BF4B82FF7145}" dt="2021-09-28T02:23:38.668" v="3339" actId="1076"/>
+          <ac:picMkLst>
+            <pc:docMk/>
+            <pc:sldMk cId="3907321315" sldId="260"/>
+            <ac:picMk id="3" creationId="{CBB64EA5-8F44-4AD8-B6F5-0D79AD1261ED}"/>
+          </ac:picMkLst>
+        </pc:picChg>
+        <pc:picChg chg="add mod">
+          <ac:chgData name="billyfryer@att.net" userId="08901168bcd6e0db" providerId="LiveId" clId="{9B4F4275-B193-47DB-B686-BF4B82FF7145}" dt="2021-09-29T03:19:41.620" v="3483" actId="14100"/>
+          <ac:picMkLst>
+            <pc:docMk/>
+            <pc:sldMk cId="3907321315" sldId="260"/>
+            <ac:picMk id="4" creationId="{392BD52A-13E5-44CC-ADFD-F75190CAC5B3}"/>
+          </ac:picMkLst>
+        </pc:picChg>
         <pc:picChg chg="add del mod">
           <ac:chgData name="billyfryer@att.net" userId="08901168bcd6e0db" providerId="LiveId" clId="{9B4F4275-B193-47DB-B686-BF4B82FF7145}" dt="2021-09-24T22:24:44.013" v="2573" actId="478"/>
           <ac:picMkLst>
@@ -578,16 +618,16 @@
             <ac:picMk id="12" creationId="{A28E0240-25BE-4306-8E36-3148520707B4}"/>
           </ac:picMkLst>
         </pc:picChg>
-        <pc:picChg chg="add mod">
-          <ac:chgData name="billyfryer@att.net" userId="08901168bcd6e0db" providerId="LiveId" clId="{9B4F4275-B193-47DB-B686-BF4B82FF7145}" dt="2021-09-24T22:26:08.342" v="2599" actId="1076"/>
+        <pc:picChg chg="add del mod">
+          <ac:chgData name="billyfryer@att.net" userId="08901168bcd6e0db" providerId="LiveId" clId="{9B4F4275-B193-47DB-B686-BF4B82FF7145}" dt="2021-09-29T03:19:25.134" v="3477" actId="478"/>
           <ac:picMkLst>
             <pc:docMk/>
             <pc:sldMk cId="3907321315" sldId="260"/>
             <ac:picMk id="15" creationId="{6D578529-CFEB-4377-BF9C-E3AE418C6593}"/>
           </ac:picMkLst>
         </pc:picChg>
-        <pc:picChg chg="add mod">
-          <ac:chgData name="billyfryer@att.net" userId="08901168bcd6e0db" providerId="LiveId" clId="{9B4F4275-B193-47DB-B686-BF4B82FF7145}" dt="2021-09-24T22:26:13.771" v="2600" actId="1076"/>
+        <pc:picChg chg="add del mod">
+          <ac:chgData name="billyfryer@att.net" userId="08901168bcd6e0db" providerId="LiveId" clId="{9B4F4275-B193-47DB-B686-BF4B82FF7145}" dt="2021-09-28T02:23:16.174" v="3332" actId="478"/>
           <ac:picMkLst>
             <pc:docMk/>
             <pc:sldMk cId="3907321315" sldId="260"/>
@@ -714,7 +754,7 @@
           <a:p>
             <a:fld id="{FB4320AF-8B4A-CC4E-84FC-EC22B6BB215E}" type="datetimeFigureOut">
               <a:rPr lang="en-US" smtClean="0"/>
-              <a:t>9/24/2021</a:t>
+              <a:t>9/28/2021</a:t>
             </a:fld>
             <a:endParaRPr lang="en-US" dirty="0"/>
           </a:p>
@@ -1112,7 +1152,7 @@
           <a:p>
             <a:fld id="{BE7EECCD-3382-5548-BA91-DAD35A04889A}" type="datetimeFigureOut">
               <a:rPr lang="en-US" smtClean="0"/>
-              <a:t>9/24/2021</a:t>
+              <a:t>9/28/2021</a:t>
             </a:fld>
             <a:endParaRPr lang="en-US" dirty="0"/>
           </a:p>
@@ -1277,7 +1317,7 @@
           <a:p>
             <a:fld id="{BE7EECCD-3382-5548-BA91-DAD35A04889A}" type="datetimeFigureOut">
               <a:rPr lang="en-US" smtClean="0"/>
-              <a:t>9/24/2021</a:t>
+              <a:t>9/28/2021</a:t>
             </a:fld>
             <a:endParaRPr lang="en-US" dirty="0"/>
           </a:p>
@@ -1452,7 +1492,7 @@
           <a:p>
             <a:fld id="{BE7EECCD-3382-5548-BA91-DAD35A04889A}" type="datetimeFigureOut">
               <a:rPr lang="en-US" smtClean="0"/>
-              <a:t>9/24/2021</a:t>
+              <a:t>9/28/2021</a:t>
             </a:fld>
             <a:endParaRPr lang="en-US" dirty="0"/>
           </a:p>
@@ -1805,7 +1845,7 @@
           <a:p>
             <a:fld id="{BE7EECCD-3382-5548-BA91-DAD35A04889A}" type="datetimeFigureOut">
               <a:rPr lang="en-US" smtClean="0"/>
-              <a:t>9/24/2021</a:t>
+              <a:t>9/28/2021</a:t>
             </a:fld>
             <a:endParaRPr lang="en-US" dirty="0"/>
           </a:p>
@@ -2044,7 +2084,7 @@
           <a:p>
             <a:fld id="{BE7EECCD-3382-5548-BA91-DAD35A04889A}" type="datetimeFigureOut">
               <a:rPr lang="en-US" smtClean="0"/>
-              <a:t>9/24/2021</a:t>
+              <a:t>9/28/2021</a:t>
             </a:fld>
             <a:endParaRPr lang="en-US" dirty="0"/>
           </a:p>
@@ -2271,7 +2311,7 @@
           <a:p>
             <a:fld id="{BE7EECCD-3382-5548-BA91-DAD35A04889A}" type="datetimeFigureOut">
               <a:rPr lang="en-US" smtClean="0"/>
-              <a:t>9/24/2021</a:t>
+              <a:t>9/28/2021</a:t>
             </a:fld>
             <a:endParaRPr lang="en-US" dirty="0"/>
           </a:p>
@@ -2633,7 +2673,7 @@
           <a:p>
             <a:fld id="{BE7EECCD-3382-5548-BA91-DAD35A04889A}" type="datetimeFigureOut">
               <a:rPr lang="en-US" smtClean="0"/>
-              <a:t>9/24/2021</a:t>
+              <a:t>9/28/2021</a:t>
             </a:fld>
             <a:endParaRPr lang="en-US" dirty="0"/>
           </a:p>
@@ -2746,7 +2786,7 @@
           <a:p>
             <a:fld id="{BE7EECCD-3382-5548-BA91-DAD35A04889A}" type="datetimeFigureOut">
               <a:rPr lang="en-US" smtClean="0"/>
-              <a:t>9/24/2021</a:t>
+              <a:t>9/28/2021</a:t>
             </a:fld>
             <a:endParaRPr lang="en-US" dirty="0"/>
           </a:p>
@@ -2836,7 +2876,7 @@
           <a:p>
             <a:fld id="{BE7EECCD-3382-5548-BA91-DAD35A04889A}" type="datetimeFigureOut">
               <a:rPr lang="en-US" smtClean="0"/>
-              <a:t>9/24/2021</a:t>
+              <a:t>9/28/2021</a:t>
             </a:fld>
             <a:endParaRPr lang="en-US" dirty="0"/>
           </a:p>
@@ -3108,7 +3148,7 @@
           <a:p>
             <a:fld id="{BE7EECCD-3382-5548-BA91-DAD35A04889A}" type="datetimeFigureOut">
               <a:rPr lang="en-US" smtClean="0"/>
-              <a:t>9/24/2021</a:t>
+              <a:t>9/28/2021</a:t>
             </a:fld>
             <a:endParaRPr lang="en-US" dirty="0"/>
           </a:p>
@@ -3359,7 +3399,7 @@
           <a:p>
             <a:fld id="{BE7EECCD-3382-5548-BA91-DAD35A04889A}" type="datetimeFigureOut">
               <a:rPr lang="en-US" smtClean="0"/>
-              <a:t>9/24/2021</a:t>
+              <a:t>9/28/2021</a:t>
             </a:fld>
             <a:endParaRPr lang="en-US" dirty="0"/>
           </a:p>
@@ -3572,7 +3612,7 @@
           <a:p>
             <a:fld id="{BE7EECCD-3382-5548-BA91-DAD35A04889A}" type="datetimeFigureOut">
               <a:rPr lang="en-US" smtClean="0"/>
-              <a:t>9/24/2021</a:t>
+              <a:t>9/28/2021</a:t>
             </a:fld>
             <a:endParaRPr lang="en-US" dirty="0"/>
           </a:p>
@@ -4672,66 +4712,6 @@
       </p:sp>
       <p:pic>
         <p:nvPicPr>
-          <p:cNvPr id="15" name="Picture 14" descr="Chart&#10;&#10;Description automatically generated">
-            <a:extLst>
-              <a:ext uri="{FF2B5EF4-FFF2-40B4-BE49-F238E27FC236}">
-                <a16:creationId xmlns:a16="http://schemas.microsoft.com/office/drawing/2014/main" id="{6D578529-CFEB-4377-BF9C-E3AE418C6593}"/>
-              </a:ext>
-            </a:extLst>
-          </p:cNvPr>
-          <p:cNvPicPr>
-            <a:picLocks noChangeAspect="1"/>
-          </p:cNvPicPr>
-          <p:nvPr/>
-        </p:nvPicPr>
-        <p:blipFill>
-          <a:blip r:embed="rId4"/>
-          <a:stretch>
-            <a:fillRect/>
-          </a:stretch>
-        </p:blipFill>
-        <p:spPr>
-          <a:xfrm>
-            <a:off x="2700027" y="177557"/>
-            <a:ext cx="2377440" cy="1828800"/>
-          </a:xfrm>
-          <a:prstGeom prst="rect">
-            <a:avLst/>
-          </a:prstGeom>
-        </p:spPr>
-      </p:pic>
-      <p:pic>
-        <p:nvPicPr>
-          <p:cNvPr id="18" name="Picture 17" descr="Diagram&#10;&#10;Description automatically generated">
-            <a:extLst>
-              <a:ext uri="{FF2B5EF4-FFF2-40B4-BE49-F238E27FC236}">
-                <a16:creationId xmlns:a16="http://schemas.microsoft.com/office/drawing/2014/main" id="{F0150277-D185-4CC9-AF12-CE27E3B351F2}"/>
-              </a:ext>
-            </a:extLst>
-          </p:cNvPr>
-          <p:cNvPicPr>
-            <a:picLocks noChangeAspect="1"/>
-          </p:cNvPicPr>
-          <p:nvPr/>
-        </p:nvPicPr>
-        <p:blipFill>
-          <a:blip r:embed="rId5"/>
-          <a:stretch>
-            <a:fillRect/>
-          </a:stretch>
-        </p:blipFill>
-        <p:spPr>
-          <a:xfrm>
-            <a:off x="5635251" y="177557"/>
-            <a:ext cx="2414016" cy="1828800"/>
-          </a:xfrm>
-          <a:prstGeom prst="rect">
-            <a:avLst/>
-          </a:prstGeom>
-        </p:spPr>
-      </p:pic>
-      <p:pic>
-        <p:nvPicPr>
           <p:cNvPr id="23" name="Picture 22" descr="Chart, diagram&#10;&#10;Description automatically generated">
             <a:extLst>
               <a:ext uri="{FF2B5EF4-FFF2-40B4-BE49-F238E27FC236}">
@@ -4745,7 +4725,7 @@
           <p:nvPr/>
         </p:nvPicPr>
         <p:blipFill>
-          <a:blip r:embed="rId6"/>
+          <a:blip r:embed="rId4"/>
           <a:stretch>
             <a:fillRect/>
           </a:stretch>
@@ -4775,7 +4755,7 @@
           <p:nvPr/>
         </p:nvPicPr>
         <p:blipFill>
-          <a:blip r:embed="rId7"/>
+          <a:blip r:embed="rId5"/>
           <a:stretch>
             <a:fillRect/>
           </a:stretch>
@@ -4805,6 +4785,66 @@
           <p:nvPr/>
         </p:nvPicPr>
         <p:blipFill>
+          <a:blip r:embed="rId6"/>
+          <a:stretch>
+            <a:fillRect/>
+          </a:stretch>
+        </p:blipFill>
+        <p:spPr>
+          <a:xfrm>
+            <a:off x="6266187" y="2351965"/>
+            <a:ext cx="1783080" cy="1371600"/>
+          </a:xfrm>
+          <a:prstGeom prst="rect">
+            <a:avLst/>
+          </a:prstGeom>
+        </p:spPr>
+      </p:pic>
+      <p:pic>
+        <p:nvPicPr>
+          <p:cNvPr id="3" name="Picture 2" descr="Diagram&#10;&#10;Description automatically generated">
+            <a:extLst>
+              <a:ext uri="{FF2B5EF4-FFF2-40B4-BE49-F238E27FC236}">
+                <a16:creationId xmlns:a16="http://schemas.microsoft.com/office/drawing/2014/main" id="{CBB64EA5-8F44-4AD8-B6F5-0D79AD1261ED}"/>
+              </a:ext>
+            </a:extLst>
+          </p:cNvPr>
+          <p:cNvPicPr>
+            <a:picLocks noChangeAspect="1"/>
+          </p:cNvPicPr>
+          <p:nvPr/>
+        </p:nvPicPr>
+        <p:blipFill>
+          <a:blip r:embed="rId7"/>
+          <a:stretch>
+            <a:fillRect/>
+          </a:stretch>
+        </p:blipFill>
+        <p:spPr>
+          <a:xfrm>
+            <a:off x="5635251" y="177557"/>
+            <a:ext cx="2414016" cy="1828800"/>
+          </a:xfrm>
+          <a:prstGeom prst="rect">
+            <a:avLst/>
+          </a:prstGeom>
+        </p:spPr>
+      </p:pic>
+      <p:pic>
+        <p:nvPicPr>
+          <p:cNvPr id="4" name="Picture 3" descr="A picture containing chart&#10;&#10;Description automatically generated">
+            <a:extLst>
+              <a:ext uri="{FF2B5EF4-FFF2-40B4-BE49-F238E27FC236}">
+                <a16:creationId xmlns:a16="http://schemas.microsoft.com/office/drawing/2014/main" id="{392BD52A-13E5-44CC-ADFD-F75190CAC5B3}"/>
+              </a:ext>
+            </a:extLst>
+          </p:cNvPr>
+          <p:cNvPicPr>
+            <a:picLocks noChangeAspect="1"/>
+          </p:cNvPicPr>
+          <p:nvPr/>
+        </p:nvPicPr>
+        <p:blipFill>
           <a:blip r:embed="rId8"/>
           <a:stretch>
             <a:fillRect/>
@@ -4812,8 +4852,8 @@
         </p:blipFill>
         <p:spPr>
           <a:xfrm>
-            <a:off x="6266187" y="2351965"/>
-            <a:ext cx="1783080" cy="1371600"/>
+            <a:off x="2700028" y="177558"/>
+            <a:ext cx="2377440" cy="1828800"/>
           </a:xfrm>
           <a:prstGeom prst="rect">
             <a:avLst/>
@@ -4902,7 +4942,7 @@
         </p:nvSpPr>
         <p:spPr>
           <a:xfrm>
-            <a:off x="248575" y="787828"/>
+            <a:off x="20715" y="787828"/>
             <a:ext cx="2529794" cy="3108543"/>
           </a:xfrm>
           <a:prstGeom prst="rect">
@@ -5092,10 +5132,10 @@
       </p:pic>
       <p:pic>
         <p:nvPicPr>
-          <p:cNvPr id="14" name="Picture 13" descr="Graphical user interface, text, application, email&#10;&#10;Description automatically generated">
+          <p:cNvPr id="3" name="Picture 2" descr="Table&#10;&#10;Description automatically generated">
             <a:extLst>
               <a:ext uri="{FF2B5EF4-FFF2-40B4-BE49-F238E27FC236}">
-                <a16:creationId xmlns:a16="http://schemas.microsoft.com/office/drawing/2014/main" id="{C97C8CCF-9190-4E66-BEC3-1AFD8174C8CA}"/>
+                <a16:creationId xmlns:a16="http://schemas.microsoft.com/office/drawing/2014/main" id="{46E744D1-ADF4-41D7-AD6E-554547C743A8}"/>
               </a:ext>
             </a:extLst>
           </p:cNvPr>
@@ -5112,8 +5152,8 @@
         </p:blipFill>
         <p:spPr>
           <a:xfrm>
-            <a:off x="2892368" y="750206"/>
-            <a:ext cx="5110904" cy="1443597"/>
+            <a:off x="3812987" y="135568"/>
+            <a:ext cx="3900933" cy="2094522"/>
           </a:xfrm>
           <a:prstGeom prst="rect">
             <a:avLst/>
@@ -5122,10 +5162,10 @@
       </p:pic>
       <p:pic>
         <p:nvPicPr>
-          <p:cNvPr id="19" name="Picture 18" descr="Table&#10;&#10;Description automatically generated">
+          <p:cNvPr id="5" name="Picture 4" descr="Graphical user interface, text, application, email&#10;&#10;Description automatically generated">
             <a:extLst>
               <a:ext uri="{FF2B5EF4-FFF2-40B4-BE49-F238E27FC236}">
-                <a16:creationId xmlns:a16="http://schemas.microsoft.com/office/drawing/2014/main" id="{DCD18F6B-24F7-4A7C-A7DA-529C8CE02004}"/>
+                <a16:creationId xmlns:a16="http://schemas.microsoft.com/office/drawing/2014/main" id="{262DB908-5865-4861-8845-4CE4BEE8B0AA}"/>
               </a:ext>
             </a:extLst>
           </p:cNvPr>
@@ -5142,8 +5182,8 @@
         </p:blipFill>
         <p:spPr>
           <a:xfrm>
-            <a:off x="2917469" y="2326948"/>
-            <a:ext cx="2419764" cy="1234440"/>
+            <a:off x="2490421" y="2599164"/>
+            <a:ext cx="2539092" cy="975518"/>
           </a:xfrm>
           <a:prstGeom prst="rect">
             <a:avLst/>
@@ -5152,10 +5192,10 @@
       </p:pic>
       <p:pic>
         <p:nvPicPr>
-          <p:cNvPr id="21" name="Picture 20" descr="Table&#10;&#10;Description automatically generated">
+          <p:cNvPr id="7" name="Picture 6" descr="Table&#10;&#10;Description automatically generated">
             <a:extLst>
               <a:ext uri="{FF2B5EF4-FFF2-40B4-BE49-F238E27FC236}">
-                <a16:creationId xmlns:a16="http://schemas.microsoft.com/office/drawing/2014/main" id="{684CC6CD-02C8-413D-93C7-58752A3B6C4C}"/>
+                <a16:creationId xmlns:a16="http://schemas.microsoft.com/office/drawing/2014/main" id="{407679C4-4284-485B-A352-F431293D3AD9}"/>
               </a:ext>
             </a:extLst>
           </p:cNvPr>
@@ -5172,8 +5212,8 @@
         </p:blipFill>
         <p:spPr>
           <a:xfrm>
-            <a:off x="5614402" y="2326948"/>
-            <a:ext cx="2476984" cy="1234440"/>
+            <a:off x="5162107" y="2423448"/>
+            <a:ext cx="2887463" cy="1326950"/>
           </a:xfrm>
           <a:prstGeom prst="rect">
             <a:avLst/>
@@ -5332,26 +5372,8 @@
             </a:pPr>
             <a:r>
               <a:rPr lang="en-US" sz="1400" dirty="0"/>
-              <a:t>The Knockout Round has insufficient data to conclude any statistically significant findings.</a:t>
-            </a:r>
-          </a:p>
-          <a:p>
-            <a:pPr marL="651510" lvl="1" indent="-285750">
-              <a:lnSpc>
-                <a:spcPct val="200000"/>
-              </a:lnSpc>
-              <a:buFont typeface="Arial" panose="020B0604020202020204" pitchFamily="34" charset="0"/>
-              <a:buChar char="•"/>
-            </a:pPr>
-            <a:r>
-              <a:rPr lang="en-US" sz="1400" dirty="0"/>
-              <a:t>If we ignore sample size issues, then the Knockout Round is the most efficient way of conducting extra innings </a:t>
-            </a:r>
-            <a:r>
-              <a:rPr lang="en-US" sz="1400"/>
-              <a:t>in terms of game time.</a:t>
-            </a:r>
-            <a:endParaRPr lang="en-US" sz="1400" dirty="0"/>
+              <a:t>On average, the Knockout Round appears to be the most efficient in reducing the length of games, however due to the small sample size there is not conclusive evidence of this. More games with the Knockout Rule coming into effect need to be played.</a:t>
+            </a:r>
           </a:p>
           <a:p>
             <a:pPr marL="285750" indent="-285750">

</xml_diff>